<commit_message>
added icons and avito contact on last slide
</commit_message>
<xml_diff>
--- a/templates/template3.pptx
+++ b/templates/template3.pptx
@@ -277,7 +277,7 @@
             <a:fld id="{1D8BD707-D9CF-40AE-B4C6-C98DA3205C09}" type="datetimeFigureOut">
               <a:rPr lang="en-US" smtClean="0"/>
               <a:pPr/>
-              <a:t>12/20/2023</a:t>
+              <a:t>12/21/2023</a:t>
             </a:fld>
             <a:endParaRPr lang="en-US"/>
           </a:p>
@@ -447,7 +447,7 @@
             <a:fld id="{1D8BD707-D9CF-40AE-B4C6-C98DA3205C09}" type="datetimeFigureOut">
               <a:rPr lang="en-US" smtClean="0"/>
               <a:pPr/>
-              <a:t>12/20/2023</a:t>
+              <a:t>12/21/2023</a:t>
             </a:fld>
             <a:endParaRPr lang="en-US"/>
           </a:p>
@@ -627,7 +627,7 @@
             <a:fld id="{1D8BD707-D9CF-40AE-B4C6-C98DA3205C09}" type="datetimeFigureOut">
               <a:rPr lang="en-US" smtClean="0"/>
               <a:pPr/>
-              <a:t>12/20/2023</a:t>
+              <a:t>12/21/2023</a:t>
             </a:fld>
             <a:endParaRPr lang="en-US"/>
           </a:p>
@@ -797,7 +797,7 @@
             <a:fld id="{1D8BD707-D9CF-40AE-B4C6-C98DA3205C09}" type="datetimeFigureOut">
               <a:rPr lang="en-US" smtClean="0"/>
               <a:pPr/>
-              <a:t>12/20/2023</a:t>
+              <a:t>12/21/2023</a:t>
             </a:fld>
             <a:endParaRPr lang="en-US"/>
           </a:p>
@@ -1044,7 +1044,7 @@
             <a:fld id="{1D8BD707-D9CF-40AE-B4C6-C98DA3205C09}" type="datetimeFigureOut">
               <a:rPr lang="en-US" smtClean="0"/>
               <a:pPr/>
-              <a:t>12/20/2023</a:t>
+              <a:t>12/21/2023</a:t>
             </a:fld>
             <a:endParaRPr lang="en-US"/>
           </a:p>
@@ -1275,7 +1275,7 @@
             <a:fld id="{1D8BD707-D9CF-40AE-B4C6-C98DA3205C09}" type="datetimeFigureOut">
               <a:rPr lang="en-US" smtClean="0"/>
               <a:pPr/>
-              <a:t>12/20/2023</a:t>
+              <a:t>12/21/2023</a:t>
             </a:fld>
             <a:endParaRPr lang="en-US"/>
           </a:p>
@@ -1641,7 +1641,7 @@
             <a:fld id="{1D8BD707-D9CF-40AE-B4C6-C98DA3205C09}" type="datetimeFigureOut">
               <a:rPr lang="en-US" smtClean="0"/>
               <a:pPr/>
-              <a:t>12/20/2023</a:t>
+              <a:t>12/21/2023</a:t>
             </a:fld>
             <a:endParaRPr lang="en-US"/>
           </a:p>
@@ -1760,7 +1760,7 @@
             <a:fld id="{1D8BD707-D9CF-40AE-B4C6-C98DA3205C09}" type="datetimeFigureOut">
               <a:rPr lang="en-US" smtClean="0"/>
               <a:pPr/>
-              <a:t>12/20/2023</a:t>
+              <a:t>12/21/2023</a:t>
             </a:fld>
             <a:endParaRPr lang="en-US"/>
           </a:p>
@@ -1857,7 +1857,7 @@
             <a:fld id="{1D8BD707-D9CF-40AE-B4C6-C98DA3205C09}" type="datetimeFigureOut">
               <a:rPr lang="en-US" smtClean="0"/>
               <a:pPr/>
-              <a:t>12/20/2023</a:t>
+              <a:t>12/21/2023</a:t>
             </a:fld>
             <a:endParaRPr lang="en-US"/>
           </a:p>
@@ -2134,7 +2134,7 @@
             <a:fld id="{1D8BD707-D9CF-40AE-B4C6-C98DA3205C09}" type="datetimeFigureOut">
               <a:rPr lang="en-US" smtClean="0"/>
               <a:pPr/>
-              <a:t>12/20/2023</a:t>
+              <a:t>12/21/2023</a:t>
             </a:fld>
             <a:endParaRPr lang="en-US"/>
           </a:p>
@@ -2388,7 +2388,7 @@
             <a:fld id="{1D8BD707-D9CF-40AE-B4C6-C98DA3205C09}" type="datetimeFigureOut">
               <a:rPr lang="en-US" smtClean="0"/>
               <a:pPr/>
-              <a:t>12/20/2023</a:t>
+              <a:t>12/21/2023</a:t>
             </a:fld>
             <a:endParaRPr lang="en-US"/>
           </a:p>
@@ -2601,7 +2601,7 @@
             <a:fld id="{1D8BD707-D9CF-40AE-B4C6-C98DA3205C09}" type="datetimeFigureOut">
               <a:rPr lang="en-US" smtClean="0"/>
               <a:pPr/>
-              <a:t>12/20/2023</a:t>
+              <a:t>12/21/2023</a:t>
             </a:fld>
             <a:endParaRPr lang="en-US"/>
           </a:p>
@@ -6119,8 +6119,8 @@
         </p:nvSpPr>
         <p:spPr>
           <a:xfrm>
-            <a:off x="1353808" y="6927801"/>
-            <a:ext cx="5031229" cy="1872307"/>
+            <a:off x="2895600" y="6871859"/>
+            <a:ext cx="3962400" cy="786241"/>
           </a:xfrm>
           <a:prstGeom prst="rect">
             <a:avLst/>
@@ -6132,7 +6132,7 @@
           </a:bodyPr>
           <a:lstStyle/>
           <a:p>
-            <a:pPr algn="ctr">
+            <a:pPr>
               <a:lnSpc>
                 <a:spcPts val="7279"/>
               </a:lnSpc>
@@ -6166,12 +6166,130 @@
               <a:cs typeface="Times New Roman" panose="02020603050405020304" pitchFamily="18" charset="0"/>
             </a:endParaRPr>
           </a:p>
-          <a:p>
-            <a:pPr algn="ctr">
+        </p:txBody>
+      </p:sp>
+      <p:pic>
+        <p:nvPicPr>
+          <p:cNvPr id="3" name="Рисунок 2">
+            <a:extLst>
+              <a:ext uri="{FF2B5EF4-FFF2-40B4-BE49-F238E27FC236}">
+                <a16:creationId xmlns:a16="http://schemas.microsoft.com/office/drawing/2014/main" id="{46DA488C-7AA3-BF72-CCDD-AAE859D8BBD2}"/>
+              </a:ext>
+            </a:extLst>
+          </p:cNvPr>
+          <p:cNvPicPr>
+            <a:picLocks noChangeAspect="1"/>
+          </p:cNvPicPr>
+          <p:nvPr/>
+        </p:nvPicPr>
+        <p:blipFill>
+          <a:blip r:embed="rId7" cstate="print">
+            <a:extLst>
+              <a:ext uri="{28A0092B-C50C-407E-A947-70E740481C1C}">
+                <a14:useLocalDpi xmlns:a14="http://schemas.microsoft.com/office/drawing/2010/main" val="0"/>
+              </a:ext>
+            </a:extLst>
+          </a:blip>
+          <a:stretch>
+            <a:fillRect/>
+          </a:stretch>
+        </p:blipFill>
+        <p:spPr>
+          <a:xfrm>
+            <a:off x="2096454" y="7130880"/>
+            <a:ext cx="609600" cy="609600"/>
+          </a:xfrm>
+          <a:prstGeom prst="rect">
+            <a:avLst/>
+          </a:prstGeom>
+        </p:spPr>
+      </p:pic>
+      <p:pic>
+        <p:nvPicPr>
+          <p:cNvPr id="12" name="Рисунок 11">
+            <a:extLst>
+              <a:ext uri="{FF2B5EF4-FFF2-40B4-BE49-F238E27FC236}">
+                <a16:creationId xmlns:a16="http://schemas.microsoft.com/office/drawing/2014/main" id="{4813A217-8CA2-F9EB-321C-26AF33B53B7D}"/>
+              </a:ext>
+            </a:extLst>
+          </p:cNvPr>
+          <p:cNvPicPr>
+            <a:picLocks noChangeAspect="1"/>
+          </p:cNvPicPr>
+          <p:nvPr/>
+        </p:nvPicPr>
+        <p:blipFill rotWithShape="1">
+          <a:blip r:embed="rId8">
+            <a:extLst>
+              <a:ext uri="{28A0092B-C50C-407E-A947-70E740481C1C}">
+                <a14:useLocalDpi xmlns:a14="http://schemas.microsoft.com/office/drawing/2010/main" val="0"/>
+              </a:ext>
+              <a:ext uri="{96DAC541-7B7A-43D3-8B79-37D633B846F1}">
+                <asvg:svgBlip xmlns:asvg="http://schemas.microsoft.com/office/drawing/2016/SVG/main" r:embed="rId9"/>
+              </a:ext>
+            </a:extLst>
+          </a:blip>
+          <a:srcRect l="4209" t="36230" r="68144" b="36122"/>
+          <a:stretch/>
+        </p:blipFill>
+        <p:spPr>
+          <a:xfrm>
+            <a:off x="2057400" y="7999341"/>
+            <a:ext cx="649359" cy="649359"/>
+          </a:xfrm>
+          <a:prstGeom prst="rect">
+            <a:avLst/>
+          </a:prstGeom>
+        </p:spPr>
+      </p:pic>
+      <p:sp>
+        <p:nvSpPr>
+          <p:cNvPr id="13" name="TextBox 13">
+            <a:extLst>
+              <a:ext uri="{FF2B5EF4-FFF2-40B4-BE49-F238E27FC236}">
+                <a16:creationId xmlns:a16="http://schemas.microsoft.com/office/drawing/2014/main" id="{B60F4341-E927-C3C6-60F7-721F96281146}"/>
+              </a:ext>
+            </a:extLst>
+          </p:cNvPr>
+          <p:cNvSpPr txBox="1"/>
+          <p:nvPr/>
+        </p:nvSpPr>
+        <p:spPr>
+          <a:xfrm>
+            <a:off x="2895600" y="7710059"/>
+            <a:ext cx="3962400" cy="786241"/>
+          </a:xfrm>
+          <a:prstGeom prst="rect">
+            <a:avLst/>
+          </a:prstGeom>
+        </p:spPr>
+        <p:txBody>
+          <a:bodyPr wrap="square" lIns="0" tIns="0" rIns="0" bIns="0" rtlCol="0" anchor="t">
+            <a:spAutoFit/>
+          </a:bodyPr>
+          <a:lstStyle/>
+          <a:p>
+            <a:pPr>
               <a:lnSpc>
                 <a:spcPts val="7279"/>
               </a:lnSpc>
             </a:pPr>
+            <a:r>
+              <a:rPr lang="ru-RU" sz="2800" dirty="0">
+                <a:latin typeface="Times New Roman" panose="02020603050405020304" pitchFamily="18" charset="0"/>
+                <a:cs typeface="Times New Roman" panose="02020603050405020304" pitchFamily="18" charset="0"/>
+                <a:hlinkClick r:id="rId10"/>
+              </a:rPr>
+              <a:t>Написать нам на </a:t>
+            </a:r>
+            <a:r>
+              <a:rPr lang="ru-RU" sz="2800" dirty="0" err="1">
+                <a:latin typeface="Times New Roman" panose="02020603050405020304" pitchFamily="18" charset="0"/>
+                <a:cs typeface="Times New Roman" panose="02020603050405020304" pitchFamily="18" charset="0"/>
+                <a:hlinkClick r:id="rId10"/>
+              </a:rPr>
+              <a:t>Авито</a:t>
+            </a:r>
             <a:endParaRPr lang="en-US" sz="2800" dirty="0">
               <a:latin typeface="Times New Roman" panose="02020603050405020304" pitchFamily="18" charset="0"/>
               <a:cs typeface="Times New Roman" panose="02020603050405020304" pitchFamily="18" charset="0"/>

</xml_diff>

<commit_message>
added telegram contact to template
</commit_message>
<xml_diff>
--- a/templates/template3.pptx
+++ b/templates/template3.pptx
@@ -6234,7 +6234,7 @@
         </p:blipFill>
         <p:spPr>
           <a:xfrm>
-            <a:off x="2057400" y="7999341"/>
+            <a:off x="2057400" y="8709382"/>
             <a:ext cx="649359" cy="649359"/>
           </a:xfrm>
           <a:prstGeom prst="rect">
@@ -6256,7 +6256,7 @@
         </p:nvSpPr>
         <p:spPr>
           <a:xfrm>
-            <a:off x="2895600" y="7710059"/>
+            <a:off x="2895600" y="8420100"/>
             <a:ext cx="3962400" cy="786241"/>
           </a:xfrm>
           <a:prstGeom prst="rect">
@@ -6297,6 +6297,97 @@
           </a:p>
         </p:txBody>
       </p:sp>
+      <p:sp>
+        <p:nvSpPr>
+          <p:cNvPr id="2" name="TextBox 13">
+            <a:extLst>
+              <a:ext uri="{FF2B5EF4-FFF2-40B4-BE49-F238E27FC236}">
+                <a16:creationId xmlns:a16="http://schemas.microsoft.com/office/drawing/2014/main" id="{2863EB5C-218A-6646-0253-9B0EE8D4A78D}"/>
+              </a:ext>
+            </a:extLst>
+          </p:cNvPr>
+          <p:cNvSpPr txBox="1"/>
+          <p:nvPr/>
+        </p:nvSpPr>
+        <p:spPr>
+          <a:xfrm>
+            <a:off x="2895600" y="7658100"/>
+            <a:ext cx="3962400" cy="786241"/>
+          </a:xfrm>
+          <a:prstGeom prst="rect">
+            <a:avLst/>
+          </a:prstGeom>
+        </p:spPr>
+        <p:txBody>
+          <a:bodyPr wrap="square" lIns="0" tIns="0" rIns="0" bIns="0" rtlCol="0" anchor="t">
+            <a:spAutoFit/>
+          </a:bodyPr>
+          <a:lstStyle/>
+          <a:p>
+            <a:pPr>
+              <a:lnSpc>
+                <a:spcPts val="7279"/>
+              </a:lnSpc>
+            </a:pPr>
+            <a:r>
+              <a:rPr lang="ru-RU" sz="2800" dirty="0">
+                <a:latin typeface="Times New Roman" panose="02020603050405020304" pitchFamily="18" charset="0"/>
+                <a:cs typeface="Times New Roman" panose="02020603050405020304" pitchFamily="18" charset="0"/>
+                <a:hlinkClick r:id="rId11"/>
+              </a:rPr>
+              <a:t>Написать нам в</a:t>
+            </a:r>
+            <a:r>
+              <a:rPr lang="en-US" sz="2800" dirty="0">
+                <a:latin typeface="Times New Roman" panose="02020603050405020304" pitchFamily="18" charset="0"/>
+                <a:cs typeface="Times New Roman" panose="02020603050405020304" pitchFamily="18" charset="0"/>
+                <a:hlinkClick r:id="rId11"/>
+              </a:rPr>
+              <a:t> Telegram</a:t>
+            </a:r>
+            <a:endParaRPr lang="en-US" sz="2800" dirty="0">
+              <a:latin typeface="Times New Roman" panose="02020603050405020304" pitchFamily="18" charset="0"/>
+              <a:cs typeface="Times New Roman" panose="02020603050405020304" pitchFamily="18" charset="0"/>
+            </a:endParaRPr>
+          </a:p>
+        </p:txBody>
+      </p:sp>
+      <p:pic>
+        <p:nvPicPr>
+          <p:cNvPr id="6" name="Рисунок 5">
+            <a:extLst>
+              <a:ext uri="{FF2B5EF4-FFF2-40B4-BE49-F238E27FC236}">
+                <a16:creationId xmlns:a16="http://schemas.microsoft.com/office/drawing/2014/main" id="{16036B07-3A49-1AB9-6952-C7C1141F75C6}"/>
+              </a:ext>
+            </a:extLst>
+          </p:cNvPr>
+          <p:cNvPicPr>
+            <a:picLocks noChangeAspect="1"/>
+          </p:cNvPicPr>
+          <p:nvPr/>
+        </p:nvPicPr>
+        <p:blipFill>
+          <a:blip r:embed="rId12" cstate="print">
+            <a:extLst>
+              <a:ext uri="{28A0092B-C50C-407E-A947-70E740481C1C}">
+                <a14:useLocalDpi xmlns:a14="http://schemas.microsoft.com/office/drawing/2010/main" val="0"/>
+              </a:ext>
+            </a:extLst>
+          </a:blip>
+          <a:stretch>
+            <a:fillRect/>
+          </a:stretch>
+        </p:blipFill>
+        <p:spPr>
+          <a:xfrm>
+            <a:off x="2057400" y="7900251"/>
+            <a:ext cx="649359" cy="649359"/>
+          </a:xfrm>
+          <a:prstGeom prst="rect">
+            <a:avLst/>
+          </a:prstGeom>
+        </p:spPr>
+      </p:pic>
     </p:spTree>
   </p:cSld>
   <p:clrMapOvr>

</xml_diff>

<commit_message>
Implemented creating of adress ya.maps url using coords. Added "Проведение торгов" field
</commit_message>
<xml_diff>
--- a/templates/template3.pptx
+++ b/templates/template3.pptx
@@ -4877,6 +4877,55 @@
           </a:p>
         </p:txBody>
       </p:sp>
+      <p:sp>
+        <p:nvSpPr>
+          <p:cNvPr id="4" name="TextBox 5">
+            <a:extLst>
+              <a:ext uri="{FF2B5EF4-FFF2-40B4-BE49-F238E27FC236}">
+                <a16:creationId xmlns:a16="http://schemas.microsoft.com/office/drawing/2014/main" id="{67EF3D08-7F41-04C3-0E34-CB96A01D3E83}"/>
+              </a:ext>
+            </a:extLst>
+          </p:cNvPr>
+          <p:cNvSpPr txBox="1"/>
+          <p:nvPr/>
+        </p:nvSpPr>
+        <p:spPr>
+          <a:xfrm>
+            <a:off x="7687761" y="7314187"/>
+            <a:ext cx="9576251" cy="448841"/>
+          </a:xfrm>
+          <a:prstGeom prst="rect">
+            <a:avLst/>
+          </a:prstGeom>
+        </p:spPr>
+        <p:txBody>
+          <a:bodyPr lIns="0" tIns="0" rIns="0" bIns="0" rtlCol="0" anchor="t">
+            <a:spAutoFit/>
+          </a:bodyPr>
+          <a:lstStyle/>
+          <a:p>
+            <a:pPr>
+              <a:lnSpc>
+                <a:spcPts val="3499"/>
+              </a:lnSpc>
+            </a:pPr>
+            <a:r>
+              <a:rPr lang="en-US" sz="3200">
+                <a:latin typeface="Times New Roman" panose="02020603050405020304" pitchFamily="18" charset="0"/>
+                <a:cs typeface="Times New Roman" panose="02020603050405020304" pitchFamily="18" charset="0"/>
+              </a:rPr>
+              <a:t>{{ tendering </a:t>
+            </a:r>
+            <a:r>
+              <a:rPr lang="en-US" sz="3200" dirty="0">
+                <a:latin typeface="Times New Roman" panose="02020603050405020304" pitchFamily="18" charset="0"/>
+                <a:cs typeface="Times New Roman" panose="02020603050405020304" pitchFamily="18" charset="0"/>
+              </a:rPr>
+              <a:t>}}</a:t>
+            </a:r>
+          </a:p>
+        </p:txBody>
+      </p:sp>
     </p:spTree>
   </p:cSld>
   <p:clrMapOvr>

</xml_diff>